<commit_message>
finished with the module 2
</commit_message>
<xml_diff>
--- a/DLTE-MyBank-Project/MyBank Banking application.pptx
+++ b/DLTE-MyBank-Project/MyBank Banking application.pptx
@@ -8,10 +8,11 @@
     <p:sldId id="256" r:id="rId2"/>
     <p:sldId id="257" r:id="rId3"/>
     <p:sldId id="261" r:id="rId4"/>
-    <p:sldId id="258" r:id="rId5"/>
+    <p:sldId id="263" r:id="rId5"/>
     <p:sldId id="259" r:id="rId6"/>
-    <p:sldId id="260" r:id="rId7"/>
-    <p:sldId id="262" r:id="rId8"/>
+    <p:sldId id="258" r:id="rId7"/>
+    <p:sldId id="260" r:id="rId8"/>
+    <p:sldId id="262" r:id="rId9"/>
   </p:sldIdLst>
   <p:sldSz cx="12192000" cy="6858000"/>
   <p:notesSz cx="6858000" cy="9144000"/>
@@ -3084,7 +3085,7 @@
           <a:p>
             <a:fld id="{40ECFC71-2634-46FD-988A-FFE1FE582C9C}" type="datetimeFigureOut">
               <a:rPr lang="en-IN" smtClean="0"/>
-              <a:t>08-04-2024</a:t>
+              <a:t>16-04-2024</a:t>
             </a:fld>
             <a:endParaRPr lang="en-IN"/>
           </a:p>
@@ -3284,7 +3285,7 @@
           <a:p>
             <a:fld id="{40ECFC71-2634-46FD-988A-FFE1FE582C9C}" type="datetimeFigureOut">
               <a:rPr lang="en-IN" smtClean="0"/>
-              <a:t>08-04-2024</a:t>
+              <a:t>16-04-2024</a:t>
             </a:fld>
             <a:endParaRPr lang="en-IN"/>
           </a:p>
@@ -3494,7 +3495,7 @@
           <a:p>
             <a:fld id="{40ECFC71-2634-46FD-988A-FFE1FE582C9C}" type="datetimeFigureOut">
               <a:rPr lang="en-IN" smtClean="0"/>
-              <a:t>08-04-2024</a:t>
+              <a:t>16-04-2024</a:t>
             </a:fld>
             <a:endParaRPr lang="en-IN"/>
           </a:p>
@@ -3694,7 +3695,7 @@
           <a:p>
             <a:fld id="{40ECFC71-2634-46FD-988A-FFE1FE582C9C}" type="datetimeFigureOut">
               <a:rPr lang="en-IN" smtClean="0"/>
-              <a:t>08-04-2024</a:t>
+              <a:t>16-04-2024</a:t>
             </a:fld>
             <a:endParaRPr lang="en-IN"/>
           </a:p>
@@ -3970,7 +3971,7 @@
           <a:p>
             <a:fld id="{40ECFC71-2634-46FD-988A-FFE1FE582C9C}" type="datetimeFigureOut">
               <a:rPr lang="en-IN" smtClean="0"/>
-              <a:t>08-04-2024</a:t>
+              <a:t>16-04-2024</a:t>
             </a:fld>
             <a:endParaRPr lang="en-IN"/>
           </a:p>
@@ -4238,7 +4239,7 @@
           <a:p>
             <a:fld id="{40ECFC71-2634-46FD-988A-FFE1FE582C9C}" type="datetimeFigureOut">
               <a:rPr lang="en-IN" smtClean="0"/>
-              <a:t>08-04-2024</a:t>
+              <a:t>16-04-2024</a:t>
             </a:fld>
             <a:endParaRPr lang="en-IN"/>
           </a:p>
@@ -4653,7 +4654,7 @@
           <a:p>
             <a:fld id="{40ECFC71-2634-46FD-988A-FFE1FE582C9C}" type="datetimeFigureOut">
               <a:rPr lang="en-IN" smtClean="0"/>
-              <a:t>08-04-2024</a:t>
+              <a:t>16-04-2024</a:t>
             </a:fld>
             <a:endParaRPr lang="en-IN"/>
           </a:p>
@@ -4795,7 +4796,7 @@
           <a:p>
             <a:fld id="{40ECFC71-2634-46FD-988A-FFE1FE582C9C}" type="datetimeFigureOut">
               <a:rPr lang="en-IN" smtClean="0"/>
-              <a:t>08-04-2024</a:t>
+              <a:t>16-04-2024</a:t>
             </a:fld>
             <a:endParaRPr lang="en-IN"/>
           </a:p>
@@ -4908,7 +4909,7 @@
           <a:p>
             <a:fld id="{40ECFC71-2634-46FD-988A-FFE1FE582C9C}" type="datetimeFigureOut">
               <a:rPr lang="en-IN" smtClean="0"/>
-              <a:t>08-04-2024</a:t>
+              <a:t>16-04-2024</a:t>
             </a:fld>
             <a:endParaRPr lang="en-IN"/>
           </a:p>
@@ -5221,7 +5222,7 @@
           <a:p>
             <a:fld id="{40ECFC71-2634-46FD-988A-FFE1FE582C9C}" type="datetimeFigureOut">
               <a:rPr lang="en-IN" smtClean="0"/>
-              <a:t>08-04-2024</a:t>
+              <a:t>16-04-2024</a:t>
             </a:fld>
             <a:endParaRPr lang="en-IN"/>
           </a:p>
@@ -5510,7 +5511,7 @@
           <a:p>
             <a:fld id="{40ECFC71-2634-46FD-988A-FFE1FE582C9C}" type="datetimeFigureOut">
               <a:rPr lang="en-IN" smtClean="0"/>
-              <a:t>08-04-2024</a:t>
+              <a:t>16-04-2024</a:t>
             </a:fld>
             <a:endParaRPr lang="en-IN"/>
           </a:p>
@@ -5753,7 +5754,7 @@
           <a:p>
             <a:fld id="{40ECFC71-2634-46FD-988A-FFE1FE582C9C}" type="datetimeFigureOut">
               <a:rPr lang="en-IN" smtClean="0"/>
-              <a:t>08-04-2024</a:t>
+              <a:t>16-04-2024</a:t>
             </a:fld>
             <a:endParaRPr lang="en-IN"/>
           </a:p>
@@ -7384,12 +7385,12 @@
           <a:chExt cx="0" cy="0"/>
         </a:xfrm>
       </p:grpSpPr>
-      <p:sp>
+      <p:sp useBgFill="1">
         <p:nvSpPr>
-          <p:cNvPr id="35" name="Down Arrow 7">
+          <p:cNvPr id="40" name="Rectangle 39">
             <a:extLst>
               <a:ext uri="{FF2B5EF4-FFF2-40B4-BE49-F238E27FC236}">
-                <a16:creationId xmlns:a16="http://schemas.microsoft.com/office/drawing/2014/main" id="{D4771268-CB57-404A-9271-370EB28F6090}"/>
+                <a16:creationId xmlns:a16="http://schemas.microsoft.com/office/drawing/2014/main" id="{665DBBEF-238B-476B-96AB-8AAC3224ECEA}"/>
               </a:ext>
               <a:ext uri="{C183D7F6-B498-43B3-948B-1728B52AA6E4}">
                 <adec:decorative xmlns:adec="http://schemas.microsoft.com/office/drawing/2017/decorative" val="1"/>
@@ -7408,20 +7409,14 @@
           </p:nvPr>
         </p:nvSpPr>
         <p:spPr>
-          <a:xfrm rot="16200000">
-            <a:off x="800100" y="1491343"/>
-            <a:ext cx="3333749" cy="3499103"/>
+          <a:xfrm>
+            <a:off x="0" y="0"/>
+            <a:ext cx="12192000" cy="6858000"/>
           </a:xfrm>
-          <a:prstGeom prst="downArrow">
-            <a:avLst>
-              <a:gd name="adj1" fmla="val 100000"/>
-              <a:gd name="adj2" fmla="val 15788"/>
-            </a:avLst>
+          <a:prstGeom prst="rect">
+            <a:avLst/>
           </a:prstGeom>
-          <a:solidFill>
-            <a:srgbClr val="404040"/>
-          </a:solidFill>
-          <a:ln w="53975">
+          <a:ln>
             <a:noFill/>
           </a:ln>
         </p:spPr>
@@ -7468,22 +7463,20 @@
         </p:nvSpPr>
         <p:spPr>
           <a:xfrm>
-            <a:off x="1028700" y="1967266"/>
-            <a:ext cx="2628900" cy="2547257"/>
+            <a:off x="638882" y="639193"/>
+            <a:ext cx="3571810" cy="3573516"/>
           </a:xfrm>
-          <a:noFill/>
         </p:spPr>
         <p:txBody>
-          <a:bodyPr vert="horz" lIns="91440" tIns="45720" rIns="91440" bIns="45720" rtlCol="0" anchor="ctr">
+          <a:bodyPr vert="horz" lIns="91440" tIns="45720" rIns="91440" bIns="45720" rtlCol="0" anchor="b">
             <a:normAutofit/>
           </a:bodyPr>
           <a:lstStyle/>
           <a:p>
-            <a:pPr algn="ctr"/>
             <a:r>
-              <a:rPr lang="en-US" sz="3600" kern="1200" dirty="0">
+              <a:rPr lang="en-US" sz="6600" kern="1200">
                 <a:solidFill>
-                  <a:srgbClr val="FFFFFF"/>
+                  <a:schemeClr val="tx1"/>
                 </a:solidFill>
                 <a:latin typeface="+mj-lt"/>
                 <a:ea typeface="+mj-ea"/>
@@ -7494,12 +7487,285 @@
           </a:p>
         </p:txBody>
       </p:sp>
+      <p:sp>
+        <p:nvSpPr>
+          <p:cNvPr id="42" name="sketch line">
+            <a:extLst>
+              <a:ext uri="{FF2B5EF4-FFF2-40B4-BE49-F238E27FC236}">
+                <a16:creationId xmlns:a16="http://schemas.microsoft.com/office/drawing/2014/main" id="{3FCFB1DE-0B7E-48CC-BA90-B2AB0889F9D6}"/>
+              </a:ext>
+              <a:ext uri="{C183D7F6-B498-43B3-948B-1728B52AA6E4}">
+                <adec:decorative xmlns:adec="http://schemas.microsoft.com/office/drawing/2017/decorative" val="1"/>
+              </a:ext>
+            </a:extLst>
+          </p:cNvPr>
+          <p:cNvSpPr>
+            <a:spLocks noGrp="1" noRot="1" noChangeAspect="1" noMove="1" noResize="1" noEditPoints="1" noAdjustHandles="1" noChangeArrowheads="1" noChangeShapeType="1" noTextEdit="1"/>
+          </p:cNvSpPr>
+          <p:nvPr>
+            <p:extLst>
+              <p:ext uri="{386F3935-93C4-4BCD-93E2-E3B085C9AB24}">
+                <p16:designElem xmlns:p16="http://schemas.microsoft.com/office/powerpoint/2015/main" val="1"/>
+              </p:ext>
+            </p:extLst>
+          </p:nvPr>
+        </p:nvSpPr>
+        <p:spPr>
+          <a:xfrm>
+            <a:off x="643278" y="4409267"/>
+            <a:ext cx="3255095" cy="18288"/>
+          </a:xfrm>
+          <a:custGeom>
+            <a:avLst/>
+            <a:gdLst>
+              <a:gd name="connsiteX0" fmla="*/ 0 w 3255095"/>
+              <a:gd name="connsiteY0" fmla="*/ 0 h 18288"/>
+              <a:gd name="connsiteX1" fmla="*/ 618468 w 3255095"/>
+              <a:gd name="connsiteY1" fmla="*/ 0 h 18288"/>
+              <a:gd name="connsiteX2" fmla="*/ 1269487 w 3255095"/>
+              <a:gd name="connsiteY2" fmla="*/ 0 h 18288"/>
+              <a:gd name="connsiteX3" fmla="*/ 1953057 w 3255095"/>
+              <a:gd name="connsiteY3" fmla="*/ 0 h 18288"/>
+              <a:gd name="connsiteX4" fmla="*/ 2636627 w 3255095"/>
+              <a:gd name="connsiteY4" fmla="*/ 0 h 18288"/>
+              <a:gd name="connsiteX5" fmla="*/ 3255095 w 3255095"/>
+              <a:gd name="connsiteY5" fmla="*/ 0 h 18288"/>
+              <a:gd name="connsiteX6" fmla="*/ 3255095 w 3255095"/>
+              <a:gd name="connsiteY6" fmla="*/ 18288 h 18288"/>
+              <a:gd name="connsiteX7" fmla="*/ 2538974 w 3255095"/>
+              <a:gd name="connsiteY7" fmla="*/ 18288 h 18288"/>
+              <a:gd name="connsiteX8" fmla="*/ 1822853 w 3255095"/>
+              <a:gd name="connsiteY8" fmla="*/ 18288 h 18288"/>
+              <a:gd name="connsiteX9" fmla="*/ 1171834 w 3255095"/>
+              <a:gd name="connsiteY9" fmla="*/ 18288 h 18288"/>
+              <a:gd name="connsiteX10" fmla="*/ 0 w 3255095"/>
+              <a:gd name="connsiteY10" fmla="*/ 18288 h 18288"/>
+              <a:gd name="connsiteX11" fmla="*/ 0 w 3255095"/>
+              <a:gd name="connsiteY11" fmla="*/ 0 h 18288"/>
+            </a:gdLst>
+            <a:ahLst/>
+            <a:cxnLst>
+              <a:cxn ang="0">
+                <a:pos x="connsiteX0" y="connsiteY0"/>
+              </a:cxn>
+              <a:cxn ang="0">
+                <a:pos x="connsiteX1" y="connsiteY1"/>
+              </a:cxn>
+              <a:cxn ang="0">
+                <a:pos x="connsiteX2" y="connsiteY2"/>
+              </a:cxn>
+              <a:cxn ang="0">
+                <a:pos x="connsiteX3" y="connsiteY3"/>
+              </a:cxn>
+              <a:cxn ang="0">
+                <a:pos x="connsiteX4" y="connsiteY4"/>
+              </a:cxn>
+              <a:cxn ang="0">
+                <a:pos x="connsiteX5" y="connsiteY5"/>
+              </a:cxn>
+              <a:cxn ang="0">
+                <a:pos x="connsiteX6" y="connsiteY6"/>
+              </a:cxn>
+              <a:cxn ang="0">
+                <a:pos x="connsiteX7" y="connsiteY7"/>
+              </a:cxn>
+              <a:cxn ang="0">
+                <a:pos x="connsiteX8" y="connsiteY8"/>
+              </a:cxn>
+              <a:cxn ang="0">
+                <a:pos x="connsiteX9" y="connsiteY9"/>
+              </a:cxn>
+              <a:cxn ang="0">
+                <a:pos x="connsiteX10" y="connsiteY10"/>
+              </a:cxn>
+              <a:cxn ang="0">
+                <a:pos x="connsiteX11" y="connsiteY11"/>
+              </a:cxn>
+            </a:cxnLst>
+            <a:rect l="l" t="t" r="r" b="b"/>
+            <a:pathLst>
+              <a:path w="3255095" h="18288" fill="none" extrusionOk="0">
+                <a:moveTo>
+                  <a:pt x="0" y="0"/>
+                </a:moveTo>
+                <a:cubicBezTo>
+                  <a:pt x="240201" y="-22123"/>
+                  <a:pt x="462021" y="-19623"/>
+                  <a:pt x="618468" y="0"/>
+                </a:cubicBezTo>
+                <a:cubicBezTo>
+                  <a:pt x="774915" y="19623"/>
+                  <a:pt x="974734" y="2035"/>
+                  <a:pt x="1269487" y="0"/>
+                </a:cubicBezTo>
+                <a:cubicBezTo>
+                  <a:pt x="1564240" y="-2035"/>
+                  <a:pt x="1733579" y="10639"/>
+                  <a:pt x="1953057" y="0"/>
+                </a:cubicBezTo>
+                <a:cubicBezTo>
+                  <a:pt x="2172535" y="-10639"/>
+                  <a:pt x="2453962" y="14018"/>
+                  <a:pt x="2636627" y="0"/>
+                </a:cubicBezTo>
+                <a:cubicBezTo>
+                  <a:pt x="2819292" y="-14018"/>
+                  <a:pt x="3121375" y="5399"/>
+                  <a:pt x="3255095" y="0"/>
+                </a:cubicBezTo>
+                <a:cubicBezTo>
+                  <a:pt x="3254386" y="8157"/>
+                  <a:pt x="3254682" y="12125"/>
+                  <a:pt x="3255095" y="18288"/>
+                </a:cubicBezTo>
+                <a:cubicBezTo>
+                  <a:pt x="3088545" y="23203"/>
+                  <a:pt x="2687475" y="7419"/>
+                  <a:pt x="2538974" y="18288"/>
+                </a:cubicBezTo>
+                <a:cubicBezTo>
+                  <a:pt x="2390473" y="29157"/>
+                  <a:pt x="2137381" y="-8959"/>
+                  <a:pt x="1822853" y="18288"/>
+                </a:cubicBezTo>
+                <a:cubicBezTo>
+                  <a:pt x="1508325" y="45535"/>
+                  <a:pt x="1466437" y="20385"/>
+                  <a:pt x="1171834" y="18288"/>
+                </a:cubicBezTo>
+                <a:cubicBezTo>
+                  <a:pt x="877231" y="16191"/>
+                  <a:pt x="561097" y="37643"/>
+                  <a:pt x="0" y="18288"/>
+                </a:cubicBezTo>
+                <a:cubicBezTo>
+                  <a:pt x="-46" y="12483"/>
+                  <a:pt x="-203" y="6491"/>
+                  <a:pt x="0" y="0"/>
+                </a:cubicBezTo>
+                <a:close/>
+              </a:path>
+              <a:path w="3255095" h="18288" stroke="0" extrusionOk="0">
+                <a:moveTo>
+                  <a:pt x="0" y="0"/>
+                </a:moveTo>
+                <a:cubicBezTo>
+                  <a:pt x="291965" y="19429"/>
+                  <a:pt x="363155" y="8568"/>
+                  <a:pt x="618468" y="0"/>
+                </a:cubicBezTo>
+                <a:cubicBezTo>
+                  <a:pt x="873781" y="-8568"/>
+                  <a:pt x="904459" y="-19505"/>
+                  <a:pt x="1171834" y="0"/>
+                </a:cubicBezTo>
+                <a:cubicBezTo>
+                  <a:pt x="1439209" y="19505"/>
+                  <a:pt x="1744369" y="9790"/>
+                  <a:pt x="1887955" y="0"/>
+                </a:cubicBezTo>
+                <a:cubicBezTo>
+                  <a:pt x="2031541" y="-9790"/>
+                  <a:pt x="2346378" y="21240"/>
+                  <a:pt x="2506423" y="0"/>
+                </a:cubicBezTo>
+                <a:cubicBezTo>
+                  <a:pt x="2666468" y="-21240"/>
+                  <a:pt x="2990257" y="30414"/>
+                  <a:pt x="3255095" y="0"/>
+                </a:cubicBezTo>
+                <a:cubicBezTo>
+                  <a:pt x="3254831" y="4493"/>
+                  <a:pt x="3255479" y="9472"/>
+                  <a:pt x="3255095" y="18288"/>
+                </a:cubicBezTo>
+                <a:cubicBezTo>
+                  <a:pt x="3120743" y="16690"/>
+                  <a:pt x="2759628" y="42462"/>
+                  <a:pt x="2604076" y="18288"/>
+                </a:cubicBezTo>
+                <a:cubicBezTo>
+                  <a:pt x="2448524" y="-5886"/>
+                  <a:pt x="2184336" y="19599"/>
+                  <a:pt x="1887955" y="18288"/>
+                </a:cubicBezTo>
+                <a:cubicBezTo>
+                  <a:pt x="1591574" y="16977"/>
+                  <a:pt x="1548845" y="6870"/>
+                  <a:pt x="1334589" y="18288"/>
+                </a:cubicBezTo>
+                <a:cubicBezTo>
+                  <a:pt x="1120333" y="29706"/>
+                  <a:pt x="996014" y="9662"/>
+                  <a:pt x="683570" y="18288"/>
+                </a:cubicBezTo>
+                <a:cubicBezTo>
+                  <a:pt x="371126" y="26914"/>
+                  <a:pt x="198687" y="16167"/>
+                  <a:pt x="0" y="18288"/>
+                </a:cubicBezTo>
+                <a:cubicBezTo>
+                  <a:pt x="843" y="9577"/>
+                  <a:pt x="371" y="6900"/>
+                  <a:pt x="0" y="0"/>
+                </a:cubicBezTo>
+                <a:close/>
+              </a:path>
+            </a:pathLst>
+          </a:custGeom>
+          <a:solidFill>
+            <a:schemeClr val="accent2"/>
+          </a:solidFill>
+          <a:ln w="38100" cap="rnd">
+            <a:solidFill>
+              <a:schemeClr val="accent2"/>
+            </a:solidFill>
+            <a:round/>
+            <a:extLst>
+              <a:ext uri="{C807C97D-BFC1-408E-A445-0C87EB9F89A2}">
+                <ask:lineSketchStyleProps xmlns:ask="http://schemas.microsoft.com/office/drawing/2018/sketchyshapes" sd="1219033472">
+                  <a:prstGeom prst="rect">
+                    <a:avLst/>
+                  </a:prstGeom>
+                  <ask:type>
+                    <ask:lineSketchFreehand/>
+                  </ask:type>
+                </ask:lineSketchStyleProps>
+              </a:ext>
+            </a:extLst>
+          </a:ln>
+        </p:spPr>
+        <p:style>
+          <a:lnRef idx="2">
+            <a:schemeClr val="accent1">
+              <a:shade val="50000"/>
+            </a:schemeClr>
+          </a:lnRef>
+          <a:fillRef idx="1">
+            <a:schemeClr val="accent1"/>
+          </a:fillRef>
+          <a:effectRef idx="0">
+            <a:schemeClr val="accent1"/>
+          </a:effectRef>
+          <a:fontRef idx="minor">
+            <a:schemeClr val="lt1"/>
+          </a:fontRef>
+        </p:style>
+        <p:txBody>
+          <a:bodyPr rtlCol="0" anchor="ctr"/>
+          <a:lstStyle/>
+          <a:p>
+            <a:pPr algn="ctr"/>
+            <a:endParaRPr lang="en-US"/>
+          </a:p>
+        </p:txBody>
+      </p:sp>
       <p:pic>
         <p:nvPicPr>
-          <p:cNvPr id="4" name="Picture 3" descr="A computer screen shot of a computer&#10;&#10;Description automatically generated">
+          <p:cNvPr id="9" name="Picture 8" descr="A screenshot of a computer&#10;&#10;Description automatically generated">
             <a:extLst>
               <a:ext uri="{FF2B5EF4-FFF2-40B4-BE49-F238E27FC236}">
-                <a16:creationId xmlns:a16="http://schemas.microsoft.com/office/drawing/2014/main" id="{0FF66B3B-10DB-D9E8-9213-1132DDA9D3FE}"/>
+                <a16:creationId xmlns:a16="http://schemas.microsoft.com/office/drawing/2014/main" id="{C9568DA4-A6E5-FCDD-8495-E965906D38F6}"/>
               </a:ext>
             </a:extLst>
           </p:cNvPr>
@@ -7522,8 +7788,8 @@
         </p:blipFill>
         <p:spPr>
           <a:xfrm>
-            <a:off x="4139311" y="934786"/>
-            <a:ext cx="8790182" cy="4988428"/>
+            <a:off x="3889920" y="702310"/>
+            <a:ext cx="8393519" cy="5762037"/>
           </a:xfrm>
           <a:prstGeom prst="rect">
             <a:avLst/>
@@ -8049,6 +8315,918 @@
 </file>
 
 <file path=ppt/slides/slide4.xml><?xml version="1.0" encoding="utf-8"?>
+<p:sld xmlns:a="http://schemas.openxmlformats.org/drawingml/2006/main" xmlns:r="http://schemas.openxmlformats.org/officeDocument/2006/relationships" xmlns:p="http://schemas.openxmlformats.org/presentationml/2006/main">
+  <p:cSld>
+    <p:bg>
+      <p:bgPr>
+        <a:solidFill>
+          <a:schemeClr val="bg1"/>
+        </a:solidFill>
+        <a:effectLst/>
+      </p:bgPr>
+    </p:bg>
+    <p:spTree>
+      <p:nvGrpSpPr>
+        <p:cNvPr id="1" name="">
+          <a:extLst>
+            <a:ext uri="{FF2B5EF4-FFF2-40B4-BE49-F238E27FC236}">
+              <a16:creationId xmlns:a16="http://schemas.microsoft.com/office/drawing/2014/main" id="{ABA72EC6-654B-EF0F-0085-F255994E6666}"/>
+            </a:ext>
+          </a:extLst>
+        </p:cNvPr>
+        <p:cNvGrpSpPr/>
+        <p:nvPr/>
+      </p:nvGrpSpPr>
+      <p:grpSpPr>
+        <a:xfrm>
+          <a:off x="0" y="0"/>
+          <a:ext cx="0" cy="0"/>
+          <a:chOff x="0" y="0"/>
+          <a:chExt cx="0" cy="0"/>
+        </a:xfrm>
+      </p:grpSpPr>
+      <p:sp useBgFill="1">
+        <p:nvSpPr>
+          <p:cNvPr id="63" name="Rectangle 62">
+            <a:extLst>
+              <a:ext uri="{FF2B5EF4-FFF2-40B4-BE49-F238E27FC236}">
+                <a16:creationId xmlns:a16="http://schemas.microsoft.com/office/drawing/2014/main" id="{9F3489EC-843F-904A-F127-DD8117026BEA}"/>
+              </a:ext>
+              <a:ext uri="{C183D7F6-B498-43B3-948B-1728B52AA6E4}">
+                <adec:decorative xmlns:adec="http://schemas.microsoft.com/office/drawing/2017/decorative" val="1"/>
+              </a:ext>
+            </a:extLst>
+          </p:cNvPr>
+          <p:cNvSpPr>
+            <a:spLocks noGrp="1" noRot="1" noChangeAspect="1" noMove="1" noResize="1" noEditPoints="1" noAdjustHandles="1" noChangeArrowheads="1" noChangeShapeType="1" noTextEdit="1"/>
+          </p:cNvSpPr>
+          <p:nvPr>
+            <p:extLst>
+              <p:ext uri="{386F3935-93C4-4BCD-93E2-E3B085C9AB24}">
+                <p16:designElem xmlns:p16="http://schemas.microsoft.com/office/powerpoint/2015/main" val="1"/>
+              </p:ext>
+            </p:extLst>
+          </p:nvPr>
+        </p:nvSpPr>
+        <p:spPr>
+          <a:xfrm>
+            <a:off x="3048" y="0"/>
+            <a:ext cx="12188952" cy="6858000"/>
+          </a:xfrm>
+          <a:prstGeom prst="rect">
+            <a:avLst/>
+          </a:prstGeom>
+          <a:ln>
+            <a:noFill/>
+          </a:ln>
+        </p:spPr>
+        <p:style>
+          <a:lnRef idx="2">
+            <a:schemeClr val="accent1">
+              <a:shade val="50000"/>
+            </a:schemeClr>
+          </a:lnRef>
+          <a:fillRef idx="1">
+            <a:schemeClr val="accent1"/>
+          </a:fillRef>
+          <a:effectRef idx="0">
+            <a:schemeClr val="accent1"/>
+          </a:effectRef>
+          <a:fontRef idx="minor">
+            <a:schemeClr val="lt1"/>
+          </a:fontRef>
+        </p:style>
+        <p:txBody>
+          <a:bodyPr rtlCol="0" anchor="ctr"/>
+          <a:lstStyle/>
+          <a:p>
+            <a:pPr algn="ctr"/>
+            <a:endParaRPr lang="en-US"/>
+          </a:p>
+        </p:txBody>
+      </p:sp>
+      <p:sp>
+        <p:nvSpPr>
+          <p:cNvPr id="65" name="Freeform: Shape 64">
+            <a:extLst>
+              <a:ext uri="{FF2B5EF4-FFF2-40B4-BE49-F238E27FC236}">
+                <a16:creationId xmlns:a16="http://schemas.microsoft.com/office/drawing/2014/main" id="{B0C0BB6B-0A02-30E9-240F-6D77D7FEFB5F}"/>
+              </a:ext>
+              <a:ext uri="{C183D7F6-B498-43B3-948B-1728B52AA6E4}">
+                <adec:decorative xmlns:adec="http://schemas.microsoft.com/office/drawing/2017/decorative" val="1"/>
+              </a:ext>
+            </a:extLst>
+          </p:cNvPr>
+          <p:cNvSpPr>
+            <a:spLocks noGrp="1" noRot="1" noChangeAspect="1" noMove="1" noResize="1" noEditPoints="1" noAdjustHandles="1" noChangeArrowheads="1" noChangeShapeType="1" noTextEdit="1"/>
+          </p:cNvSpPr>
+          <p:nvPr>
+            <p:extLst>
+              <p:ext uri="{386F3935-93C4-4BCD-93E2-E3B085C9AB24}">
+                <p16:designElem xmlns:p16="http://schemas.microsoft.com/office/powerpoint/2015/main" val="1"/>
+              </p:ext>
+            </p:extLst>
+          </p:nvPr>
+        </p:nvSpPr>
+        <p:spPr>
+          <a:xfrm>
+            <a:off x="1" y="0"/>
+            <a:ext cx="4167271" cy="6858000"/>
+          </a:xfrm>
+          <a:custGeom>
+            <a:avLst/>
+            <a:gdLst>
+              <a:gd name="connsiteX0" fmla="*/ 0 w 4167271"/>
+              <a:gd name="connsiteY0" fmla="*/ 0 h 6858000"/>
+              <a:gd name="connsiteX1" fmla="*/ 2259550 w 4167271"/>
+              <a:gd name="connsiteY1" fmla="*/ 0 h 6858000"/>
+              <a:gd name="connsiteX2" fmla="*/ 2387803 w 4167271"/>
+              <a:gd name="connsiteY2" fmla="*/ 82222 h 6858000"/>
+              <a:gd name="connsiteX3" fmla="*/ 4167271 w 4167271"/>
+              <a:gd name="connsiteY3" fmla="*/ 3429000 h 6858000"/>
+              <a:gd name="connsiteX4" fmla="*/ 2387803 w 4167271"/>
+              <a:gd name="connsiteY4" fmla="*/ 6775779 h 6858000"/>
+              <a:gd name="connsiteX5" fmla="*/ 2259550 w 4167271"/>
+              <a:gd name="connsiteY5" fmla="*/ 6858000 h 6858000"/>
+              <a:gd name="connsiteX6" fmla="*/ 0 w 4167271"/>
+              <a:gd name="connsiteY6" fmla="*/ 6858000 h 6858000"/>
+            </a:gdLst>
+            <a:ahLst/>
+            <a:cxnLst>
+              <a:cxn ang="0">
+                <a:pos x="connsiteX0" y="connsiteY0"/>
+              </a:cxn>
+              <a:cxn ang="0">
+                <a:pos x="connsiteX1" y="connsiteY1"/>
+              </a:cxn>
+              <a:cxn ang="0">
+                <a:pos x="connsiteX2" y="connsiteY2"/>
+              </a:cxn>
+              <a:cxn ang="0">
+                <a:pos x="connsiteX3" y="connsiteY3"/>
+              </a:cxn>
+              <a:cxn ang="0">
+                <a:pos x="connsiteX4" y="connsiteY4"/>
+              </a:cxn>
+              <a:cxn ang="0">
+                <a:pos x="connsiteX5" y="connsiteY5"/>
+              </a:cxn>
+              <a:cxn ang="0">
+                <a:pos x="connsiteX6" y="connsiteY6"/>
+              </a:cxn>
+            </a:cxnLst>
+            <a:rect l="l" t="t" r="r" b="b"/>
+            <a:pathLst>
+              <a:path w="4167271" h="6858000">
+                <a:moveTo>
+                  <a:pt x="0" y="0"/>
+                </a:moveTo>
+                <a:lnTo>
+                  <a:pt x="2259550" y="0"/>
+                </a:lnTo>
+                <a:lnTo>
+                  <a:pt x="2387803" y="82222"/>
+                </a:lnTo>
+                <a:cubicBezTo>
+                  <a:pt x="3461407" y="807534"/>
+                  <a:pt x="4167271" y="2035835"/>
+                  <a:pt x="4167271" y="3429000"/>
+                </a:cubicBezTo>
+                <a:cubicBezTo>
+                  <a:pt x="4167271" y="4822165"/>
+                  <a:pt x="3461407" y="6050467"/>
+                  <a:pt x="2387803" y="6775779"/>
+                </a:cubicBezTo>
+                <a:lnTo>
+                  <a:pt x="2259550" y="6858000"/>
+                </a:lnTo>
+                <a:lnTo>
+                  <a:pt x="0" y="6858000"/>
+                </a:lnTo>
+                <a:close/>
+              </a:path>
+            </a:pathLst>
+          </a:custGeom>
+          <a:solidFill>
+            <a:schemeClr val="accent2"/>
+          </a:solidFill>
+          <a:ln>
+            <a:noFill/>
+          </a:ln>
+        </p:spPr>
+        <p:style>
+          <a:lnRef idx="2">
+            <a:schemeClr val="accent1">
+              <a:shade val="50000"/>
+            </a:schemeClr>
+          </a:lnRef>
+          <a:fillRef idx="1">
+            <a:schemeClr val="accent1"/>
+          </a:fillRef>
+          <a:effectRef idx="0">
+            <a:schemeClr val="accent1"/>
+          </a:effectRef>
+          <a:fontRef idx="minor">
+            <a:schemeClr val="lt1"/>
+          </a:fontRef>
+        </p:style>
+        <p:txBody>
+          <a:bodyPr rtlCol="0" anchor="ctr"/>
+          <a:lstStyle/>
+          <a:p>
+            <a:pPr algn="ctr"/>
+            <a:endParaRPr lang="en-US"/>
+          </a:p>
+        </p:txBody>
+      </p:sp>
+      <p:sp>
+        <p:nvSpPr>
+          <p:cNvPr id="2" name="Title 1">
+            <a:extLst>
+              <a:ext uri="{FF2B5EF4-FFF2-40B4-BE49-F238E27FC236}">
+                <a16:creationId xmlns:a16="http://schemas.microsoft.com/office/drawing/2014/main" id="{2F7E423D-5D87-CF7E-6F2B-507CBD335777}"/>
+              </a:ext>
+            </a:extLst>
+          </p:cNvPr>
+          <p:cNvSpPr>
+            <a:spLocks noGrp="1"/>
+          </p:cNvSpPr>
+          <p:nvPr>
+            <p:ph type="title"/>
+          </p:nvPr>
+        </p:nvSpPr>
+        <p:spPr>
+          <a:xfrm>
+            <a:off x="686834" y="1153572"/>
+            <a:ext cx="3200400" cy="4461163"/>
+          </a:xfrm>
+        </p:spPr>
+        <p:txBody>
+          <a:bodyPr>
+            <a:normAutofit/>
+          </a:bodyPr>
+          <a:lstStyle/>
+          <a:p>
+            <a:r>
+              <a:rPr lang="en-US" b="1" dirty="0">
+                <a:solidFill>
+                  <a:srgbClr val="FFFFFF"/>
+                </a:solidFill>
+              </a:rPr>
+              <a:t>POST INSURANCE  MODULE:</a:t>
+            </a:r>
+            <a:br>
+              <a:rPr lang="en-US" b="1" dirty="0">
+                <a:solidFill>
+                  <a:srgbClr val="FFFFFF"/>
+                </a:solidFill>
+              </a:rPr>
+            </a:br>
+            <a:endParaRPr lang="en-US" dirty="0">
+              <a:solidFill>
+                <a:srgbClr val="FFFFFF"/>
+              </a:solidFill>
+            </a:endParaRPr>
+          </a:p>
+        </p:txBody>
+      </p:sp>
+      <p:sp>
+        <p:nvSpPr>
+          <p:cNvPr id="67" name="Arc 66">
+            <a:extLst>
+              <a:ext uri="{FF2B5EF4-FFF2-40B4-BE49-F238E27FC236}">
+                <a16:creationId xmlns:a16="http://schemas.microsoft.com/office/drawing/2014/main" id="{00F5DFC7-FD4A-7222-078C-CADB8C6D0BA8}"/>
+              </a:ext>
+              <a:ext uri="{C183D7F6-B498-43B3-948B-1728B52AA6E4}">
+                <adec:decorative xmlns:adec="http://schemas.microsoft.com/office/drawing/2017/decorative" val="1"/>
+              </a:ext>
+            </a:extLst>
+          </p:cNvPr>
+          <p:cNvSpPr>
+            <a:spLocks noGrp="1" noRot="1" noChangeAspect="1" noMove="1" noResize="1" noEditPoints="1" noAdjustHandles="1" noChangeArrowheads="1" noChangeShapeType="1" noTextEdit="1"/>
+          </p:cNvSpPr>
+          <p:nvPr>
+            <p:extLst>
+              <p:ext uri="{386F3935-93C4-4BCD-93E2-E3B085C9AB24}">
+                <p16:designElem xmlns:p16="http://schemas.microsoft.com/office/powerpoint/2015/main" val="1"/>
+              </p:ext>
+            </p:extLst>
+          </p:nvPr>
+        </p:nvSpPr>
+        <p:spPr>
+          <a:xfrm flipV="1">
+            <a:off x="7550402" y="2455479"/>
+            <a:ext cx="4083433" cy="4083433"/>
+          </a:xfrm>
+          <a:prstGeom prst="arc">
+            <a:avLst/>
+          </a:prstGeom>
+          <a:ln w="127000" cap="rnd">
+            <a:solidFill>
+              <a:schemeClr val="accent4"/>
+            </a:solidFill>
+            <a:prstDash val="dash"/>
+          </a:ln>
+        </p:spPr>
+        <p:style>
+          <a:lnRef idx="1">
+            <a:schemeClr val="accent1"/>
+          </a:lnRef>
+          <a:fillRef idx="0">
+            <a:schemeClr val="accent1"/>
+          </a:fillRef>
+          <a:effectRef idx="0">
+            <a:schemeClr val="accent1"/>
+          </a:effectRef>
+          <a:fontRef idx="minor">
+            <a:schemeClr val="tx1"/>
+          </a:fontRef>
+        </p:style>
+        <p:txBody>
+          <a:bodyPr rtlCol="0" anchor="ctr"/>
+          <a:lstStyle/>
+          <a:p>
+            <a:pPr algn="ctr"/>
+            <a:endParaRPr lang="en-US" dirty="0"/>
+          </a:p>
+        </p:txBody>
+      </p:sp>
+      <p:sp>
+        <p:nvSpPr>
+          <p:cNvPr id="72" name="Content Placeholder 2">
+            <a:extLst>
+              <a:ext uri="{FF2B5EF4-FFF2-40B4-BE49-F238E27FC236}">
+                <a16:creationId xmlns:a16="http://schemas.microsoft.com/office/drawing/2014/main" id="{A8F1880E-A55F-8CC1-37B8-484212D50DE7}"/>
+              </a:ext>
+            </a:extLst>
+          </p:cNvPr>
+          <p:cNvSpPr>
+            <a:spLocks noGrp="1"/>
+          </p:cNvSpPr>
+          <p:nvPr>
+            <p:ph idx="1"/>
+          </p:nvPr>
+        </p:nvSpPr>
+        <p:spPr>
+          <a:xfrm>
+            <a:off x="4447308" y="591344"/>
+            <a:ext cx="6906491" cy="5585619"/>
+          </a:xfrm>
+        </p:spPr>
+        <p:txBody>
+          <a:bodyPr anchor="ctr">
+            <a:normAutofit lnSpcReduction="10000"/>
+          </a:bodyPr>
+          <a:lstStyle/>
+          <a:p>
+            <a:pPr marL="0" indent="0">
+              <a:spcBef>
+                <a:spcPts val="1200"/>
+              </a:spcBef>
+              <a:buNone/>
+            </a:pPr>
+            <a:r>
+              <a:rPr lang="en-US" dirty="0"/>
+              <a:t>Upon the successful login, we provide a menu of insurance types.</a:t>
+            </a:r>
+          </a:p>
+          <a:p>
+            <a:pPr marL="0" indent="0">
+              <a:spcBef>
+                <a:spcPts val="1200"/>
+              </a:spcBef>
+              <a:buNone/>
+            </a:pPr>
+            <a:r>
+              <a:rPr lang="en-US" b="1" dirty="0">
+                <a:highlight>
+                  <a:srgbClr val="FFFFFF"/>
+                </a:highlight>
+                <a:latin typeface="Roboto"/>
+                <a:ea typeface="Roboto"/>
+                <a:cs typeface="Roboto"/>
+                <a:sym typeface="Roboto"/>
+              </a:rPr>
+              <a:t>Apply for Insurance :</a:t>
+            </a:r>
+            <a:r>
+              <a:rPr lang="en-US" dirty="0">
+                <a:highlight>
+                  <a:srgbClr val="FFFFFF"/>
+                </a:highlight>
+                <a:latin typeface="Roboto"/>
+                <a:ea typeface="Roboto"/>
+                <a:cs typeface="Roboto"/>
+                <a:sym typeface="Roboto"/>
+              </a:rPr>
+              <a:t> user applies for the insurance through the form. Below given are the attributes</a:t>
+            </a:r>
+            <a:endParaRPr lang="en-US" dirty="0">
+              <a:highlight>
+                <a:srgbClr val="FFFFFF"/>
+              </a:highlight>
+              <a:latin typeface="Roboto"/>
+              <a:ea typeface="Roboto"/>
+              <a:cs typeface="Roboto"/>
+            </a:endParaRPr>
+          </a:p>
+          <a:p>
+            <a:r>
+              <a:rPr lang="en-US" sz="2200" dirty="0">
+                <a:highlight>
+                  <a:srgbClr val="FFFFFF"/>
+                </a:highlight>
+                <a:latin typeface="Roboto"/>
+                <a:ea typeface="Roboto"/>
+              </a:rPr>
+              <a:t>INSURANCE_TYPE</a:t>
+            </a:r>
+          </a:p>
+          <a:p>
+            <a:r>
+              <a:rPr lang="en-US" sz="2200" dirty="0">
+                <a:highlight>
+                  <a:srgbClr val="FFFFFF"/>
+                </a:highlight>
+                <a:latin typeface="Roboto"/>
+                <a:ea typeface="Roboto"/>
+              </a:rPr>
+              <a:t>INSURANCE_NAME</a:t>
+            </a:r>
+          </a:p>
+          <a:p>
+            <a:r>
+              <a:rPr lang="en-US" sz="2200" dirty="0">
+                <a:highlight>
+                  <a:srgbClr val="FFFFFF"/>
+                </a:highlight>
+                <a:latin typeface="Roboto"/>
+                <a:ea typeface="Roboto"/>
+              </a:rPr>
+              <a:t>INSURANCE_KEY_BENEFITS</a:t>
+            </a:r>
+          </a:p>
+          <a:p>
+            <a:r>
+              <a:rPr lang="en-US" sz="2200" dirty="0">
+                <a:highlight>
+                  <a:srgbClr val="FFFFFF"/>
+                </a:highlight>
+                <a:latin typeface="Roboto"/>
+                <a:ea typeface="Roboto"/>
+              </a:rPr>
+              <a:t>INSURANCE_LIFETIME</a:t>
+            </a:r>
+          </a:p>
+          <a:p>
+            <a:r>
+              <a:rPr lang="en-US" sz="2200" dirty="0">
+                <a:highlight>
+                  <a:srgbClr val="FFFFFF"/>
+                </a:highlight>
+                <a:latin typeface="Roboto"/>
+                <a:ea typeface="Roboto"/>
+              </a:rPr>
+              <a:t>INSURANCE_PREMIUM</a:t>
+            </a:r>
+          </a:p>
+          <a:p>
+            <a:r>
+              <a:rPr lang="en-US" sz="2200" dirty="0">
+                <a:highlight>
+                  <a:srgbClr val="FFFFFF"/>
+                </a:highlight>
+                <a:latin typeface="Roboto"/>
+                <a:ea typeface="Roboto"/>
+              </a:rPr>
+              <a:t>INSURANCE_COVERAGE</a:t>
+            </a:r>
+          </a:p>
+          <a:p>
+            <a:r>
+              <a:rPr lang="en-US" sz="2200" dirty="0">
+                <a:highlight>
+                  <a:srgbClr val="FFFFFF"/>
+                </a:highlight>
+                <a:latin typeface="Roboto"/>
+                <a:ea typeface="Roboto"/>
+              </a:rPr>
+              <a:t>CUSTOMER_ID</a:t>
+            </a:r>
+          </a:p>
+          <a:p>
+            <a:r>
+              <a:rPr lang="en-US" sz="2200" dirty="0">
+                <a:highlight>
+                  <a:srgbClr val="FFFFFF"/>
+                </a:highlight>
+                <a:latin typeface="Roboto"/>
+                <a:ea typeface="Roboto"/>
+              </a:rPr>
+              <a:t>INSURANCE_ID</a:t>
+            </a:r>
+          </a:p>
+          <a:p>
+            <a:r>
+              <a:rPr lang="en-US" sz="2200" dirty="0">
+                <a:highlight>
+                  <a:srgbClr val="FFFFFF"/>
+                </a:highlight>
+                <a:latin typeface="Roboto"/>
+                <a:ea typeface="Roboto"/>
+              </a:rPr>
+              <a:t>INSURANCE_AVAIL_ID</a:t>
+            </a:r>
+            <a:endParaRPr lang="en-US" sz="2200" dirty="0"/>
+          </a:p>
+        </p:txBody>
+      </p:sp>
+    </p:spTree>
+    <p:extLst>
+      <p:ext uri="{BB962C8B-B14F-4D97-AF65-F5344CB8AC3E}">
+        <p14:creationId xmlns:p14="http://schemas.microsoft.com/office/powerpoint/2010/main" val="3628143938"/>
+      </p:ext>
+    </p:extLst>
+  </p:cSld>
+  <p:clrMapOvr>
+    <a:masterClrMapping/>
+  </p:clrMapOvr>
+</p:sld>
+</file>
+
+<file path=ppt/slides/slide5.xml><?xml version="1.0" encoding="utf-8"?>
+<p:sld xmlns:a="http://schemas.openxmlformats.org/drawingml/2006/main" xmlns:r="http://schemas.openxmlformats.org/officeDocument/2006/relationships" xmlns:p="http://schemas.openxmlformats.org/presentationml/2006/main">
+  <p:cSld>
+    <p:bg>
+      <p:bgPr>
+        <a:solidFill>
+          <a:schemeClr val="bg1"/>
+        </a:solidFill>
+        <a:effectLst/>
+      </p:bgPr>
+    </p:bg>
+    <p:spTree>
+      <p:nvGrpSpPr>
+        <p:cNvPr id="1" name=""/>
+        <p:cNvGrpSpPr/>
+        <p:nvPr/>
+      </p:nvGrpSpPr>
+      <p:grpSpPr>
+        <a:xfrm>
+          <a:off x="0" y="0"/>
+          <a:ext cx="0" cy="0"/>
+          <a:chOff x="0" y="0"/>
+          <a:chExt cx="0" cy="0"/>
+        </a:xfrm>
+      </p:grpSpPr>
+      <p:sp useBgFill="1">
+        <p:nvSpPr>
+          <p:cNvPr id="30" name="Rectangle 29">
+            <a:extLst>
+              <a:ext uri="{FF2B5EF4-FFF2-40B4-BE49-F238E27FC236}">
+                <a16:creationId xmlns:a16="http://schemas.microsoft.com/office/drawing/2014/main" id="{BA79A7CF-01AF-4178-9369-94E0C90EB046}"/>
+              </a:ext>
+              <a:ext uri="{C183D7F6-B498-43B3-948B-1728B52AA6E4}">
+                <adec:decorative xmlns:adec="http://schemas.microsoft.com/office/drawing/2017/decorative" val="1"/>
+              </a:ext>
+            </a:extLst>
+          </p:cNvPr>
+          <p:cNvSpPr>
+            <a:spLocks noGrp="1" noRot="1" noChangeAspect="1" noMove="1" noResize="1" noEditPoints="1" noAdjustHandles="1" noChangeArrowheads="1" noChangeShapeType="1" noTextEdit="1"/>
+          </p:cNvSpPr>
+          <p:nvPr>
+            <p:extLst>
+              <p:ext uri="{386F3935-93C4-4BCD-93E2-E3B085C9AB24}">
+                <p16:designElem xmlns:p16="http://schemas.microsoft.com/office/powerpoint/2015/main" val="1"/>
+              </p:ext>
+            </p:extLst>
+          </p:nvPr>
+        </p:nvSpPr>
+        <p:spPr>
+          <a:xfrm>
+            <a:off x="0" y="0"/>
+            <a:ext cx="12191999" cy="6857365"/>
+          </a:xfrm>
+          <a:prstGeom prst="rect">
+            <a:avLst/>
+          </a:prstGeom>
+          <a:ln>
+            <a:noFill/>
+          </a:ln>
+        </p:spPr>
+        <p:style>
+          <a:lnRef idx="2">
+            <a:schemeClr val="accent1">
+              <a:shade val="50000"/>
+            </a:schemeClr>
+          </a:lnRef>
+          <a:fillRef idx="1">
+            <a:schemeClr val="accent1"/>
+          </a:fillRef>
+          <a:effectRef idx="0">
+            <a:schemeClr val="accent1"/>
+          </a:effectRef>
+          <a:fontRef idx="minor">
+            <a:schemeClr val="lt1"/>
+          </a:fontRef>
+        </p:style>
+        <p:txBody>
+          <a:bodyPr rtlCol="0" anchor="ctr"/>
+          <a:lstStyle/>
+          <a:p>
+            <a:pPr algn="ctr"/>
+            <a:endParaRPr lang="en-US"/>
+          </a:p>
+        </p:txBody>
+      </p:sp>
+      <p:sp>
+        <p:nvSpPr>
+          <p:cNvPr id="2" name="Title 1">
+            <a:extLst>
+              <a:ext uri="{FF2B5EF4-FFF2-40B4-BE49-F238E27FC236}">
+                <a16:creationId xmlns:a16="http://schemas.microsoft.com/office/drawing/2014/main" id="{18A13ECF-8C54-8F6B-C54C-3BCA237A5A68}"/>
+              </a:ext>
+            </a:extLst>
+          </p:cNvPr>
+          <p:cNvSpPr>
+            <a:spLocks noGrp="1"/>
+          </p:cNvSpPr>
+          <p:nvPr>
+            <p:ph type="title"/>
+          </p:nvPr>
+        </p:nvSpPr>
+        <p:spPr>
+          <a:xfrm>
+            <a:off x="9267909" y="2023110"/>
+            <a:ext cx="2622006" cy="2846070"/>
+          </a:xfrm>
+        </p:spPr>
+        <p:txBody>
+          <a:bodyPr vert="horz" lIns="91440" tIns="45720" rIns="91440" bIns="45720" rtlCol="0" anchor="ctr">
+            <a:normAutofit/>
+          </a:bodyPr>
+          <a:lstStyle/>
+          <a:p>
+            <a:r>
+              <a:rPr lang="en-US" sz="4800" kern="1200" dirty="0">
+                <a:solidFill>
+                  <a:schemeClr val="tx1"/>
+                </a:solidFill>
+                <a:latin typeface="+mj-lt"/>
+                <a:ea typeface="+mj-ea"/>
+                <a:cs typeface="+mj-cs"/>
+              </a:rPr>
+              <a:t>Data Flow Diagram</a:t>
+            </a:r>
+          </a:p>
+        </p:txBody>
+      </p:sp>
+      <p:sp>
+        <p:nvSpPr>
+          <p:cNvPr id="32" name="Rectangle 31">
+            <a:extLst>
+              <a:ext uri="{FF2B5EF4-FFF2-40B4-BE49-F238E27FC236}">
+                <a16:creationId xmlns:a16="http://schemas.microsoft.com/office/drawing/2014/main" id="{99413ED5-9ED4-4772-BCE4-2BCAE6B12E35}"/>
+              </a:ext>
+              <a:ext uri="{C183D7F6-B498-43B3-948B-1728B52AA6E4}">
+                <adec:decorative xmlns:adec="http://schemas.microsoft.com/office/drawing/2017/decorative" val="1"/>
+              </a:ext>
+            </a:extLst>
+          </p:cNvPr>
+          <p:cNvSpPr>
+            <a:spLocks noGrp="1" noRot="1" noChangeAspect="1" noMove="1" noResize="1" noEditPoints="1" noAdjustHandles="1" noChangeArrowheads="1" noChangeShapeType="1" noTextEdit="1"/>
+          </p:cNvSpPr>
+          <p:nvPr>
+            <p:extLst>
+              <p:ext uri="{386F3935-93C4-4BCD-93E2-E3B085C9AB24}">
+                <p16:designElem xmlns:p16="http://schemas.microsoft.com/office/powerpoint/2015/main" val="1"/>
+              </p:ext>
+            </p:extLst>
+          </p:nvPr>
+        </p:nvSpPr>
+        <p:spPr>
+          <a:xfrm rot="16200000">
+            <a:off x="3433973" y="-827233"/>
+            <a:ext cx="1715478" cy="8583421"/>
+          </a:xfrm>
+          <a:prstGeom prst="rect">
+            <a:avLst/>
+          </a:prstGeom>
+          <a:solidFill>
+            <a:schemeClr val="accent4"/>
+          </a:solidFill>
+          <a:ln>
+            <a:noFill/>
+          </a:ln>
+        </p:spPr>
+        <p:style>
+          <a:lnRef idx="2">
+            <a:schemeClr val="accent1">
+              <a:shade val="50000"/>
+            </a:schemeClr>
+          </a:lnRef>
+          <a:fillRef idx="1">
+            <a:schemeClr val="accent1"/>
+          </a:fillRef>
+          <a:effectRef idx="0">
+            <a:schemeClr val="accent1"/>
+          </a:effectRef>
+          <a:fontRef idx="minor">
+            <a:schemeClr val="lt1"/>
+          </a:fontRef>
+        </p:style>
+        <p:txBody>
+          <a:bodyPr rtlCol="0" anchor="ctr"/>
+          <a:lstStyle/>
+          <a:p>
+            <a:pPr algn="ctr"/>
+            <a:endParaRPr lang="en-US" dirty="0"/>
+          </a:p>
+        </p:txBody>
+      </p:sp>
+      <p:sp>
+        <p:nvSpPr>
+          <p:cNvPr id="34" name="Rectangle 33">
+            <a:extLst>
+              <a:ext uri="{FF2B5EF4-FFF2-40B4-BE49-F238E27FC236}">
+                <a16:creationId xmlns:a16="http://schemas.microsoft.com/office/drawing/2014/main" id="{04357C93-F0CB-4A1C-8F77-4E9063789819}"/>
+              </a:ext>
+              <a:ext uri="{C183D7F6-B498-43B3-948B-1728B52AA6E4}">
+                <adec:decorative xmlns:adec="http://schemas.microsoft.com/office/drawing/2017/decorative" val="1"/>
+              </a:ext>
+            </a:extLst>
+          </p:cNvPr>
+          <p:cNvSpPr>
+            <a:spLocks noGrp="1" noRot="1" noChangeAspect="1" noMove="1" noResize="1" noEditPoints="1" noAdjustHandles="1" noChangeArrowheads="1" noChangeShapeType="1" noTextEdit="1"/>
+          </p:cNvSpPr>
+          <p:nvPr>
+            <p:extLst>
+              <p:ext uri="{386F3935-93C4-4BCD-93E2-E3B085C9AB24}">
+                <p16:designElem xmlns:p16="http://schemas.microsoft.com/office/powerpoint/2015/main" val="1"/>
+              </p:ext>
+            </p:extLst>
+          </p:nvPr>
+        </p:nvSpPr>
+        <p:spPr>
+          <a:xfrm>
+            <a:off x="302085" y="664308"/>
+            <a:ext cx="8082632" cy="5600340"/>
+          </a:xfrm>
+          <a:prstGeom prst="rect">
+            <a:avLst/>
+          </a:prstGeom>
+          <a:solidFill>
+            <a:schemeClr val="bg1"/>
+          </a:solidFill>
+          <a:ln>
+            <a:noFill/>
+          </a:ln>
+          <a:effectLst>
+            <a:outerShdw blurRad="139700" dist="127000" dir="5400000" algn="t" rotWithShape="0">
+              <a:prstClr val="black">
+                <a:alpha val="15000"/>
+              </a:prstClr>
+            </a:outerShdw>
+          </a:effectLst>
+        </p:spPr>
+        <p:style>
+          <a:lnRef idx="2">
+            <a:schemeClr val="accent1">
+              <a:shade val="50000"/>
+            </a:schemeClr>
+          </a:lnRef>
+          <a:fillRef idx="1">
+            <a:schemeClr val="accent1"/>
+          </a:fillRef>
+          <a:effectRef idx="0">
+            <a:schemeClr val="accent1"/>
+          </a:effectRef>
+          <a:fontRef idx="minor">
+            <a:schemeClr val="lt1"/>
+          </a:fontRef>
+        </p:style>
+        <p:txBody>
+          <a:bodyPr rtlCol="0" anchor="ctr"/>
+          <a:lstStyle/>
+          <a:p>
+            <a:pPr algn="ctr"/>
+            <a:endParaRPr lang="en-US"/>
+          </a:p>
+        </p:txBody>
+      </p:sp>
+      <p:pic>
+        <p:nvPicPr>
+          <p:cNvPr id="5" name="Picture 4" descr="A diagram of a flowchart&#10;&#10;Description automatically generated">
+            <a:extLst>
+              <a:ext uri="{FF2B5EF4-FFF2-40B4-BE49-F238E27FC236}">
+                <a16:creationId xmlns:a16="http://schemas.microsoft.com/office/drawing/2014/main" id="{84FBF44C-91E8-6861-E646-CD3FA8B7052E}"/>
+              </a:ext>
+            </a:extLst>
+          </p:cNvPr>
+          <p:cNvPicPr>
+            <a:picLocks noChangeAspect="1"/>
+          </p:cNvPicPr>
+          <p:nvPr/>
+        </p:nvPicPr>
+        <p:blipFill>
+          <a:blip r:embed="rId2">
+            <a:extLst>
+              <a:ext uri="{28A0092B-C50C-407E-A947-70E740481C1C}">
+                <a14:useLocalDpi xmlns:a14="http://schemas.microsoft.com/office/drawing/2010/main" val="0"/>
+              </a:ext>
+            </a:extLst>
+          </a:blip>
+          <a:stretch>
+            <a:fillRect/>
+          </a:stretch>
+        </p:blipFill>
+        <p:spPr>
+          <a:xfrm>
+            <a:off x="545238" y="1806592"/>
+            <a:ext cx="7608304" cy="3315771"/>
+          </a:xfrm>
+          <a:prstGeom prst="rect">
+            <a:avLst/>
+          </a:prstGeom>
+        </p:spPr>
+      </p:pic>
+      <p:sp>
+        <p:nvSpPr>
+          <p:cNvPr id="36" name="Rectangle 35">
+            <a:extLst>
+              <a:ext uri="{FF2B5EF4-FFF2-40B4-BE49-F238E27FC236}">
+                <a16:creationId xmlns:a16="http://schemas.microsoft.com/office/drawing/2014/main" id="{90F533E9-6690-41A8-A372-4C6C622D028D}"/>
+              </a:ext>
+              <a:ext uri="{C183D7F6-B498-43B3-948B-1728B52AA6E4}">
+                <adec:decorative xmlns:adec="http://schemas.microsoft.com/office/drawing/2017/decorative" val="1"/>
+              </a:ext>
+            </a:extLst>
+          </p:cNvPr>
+          <p:cNvSpPr>
+            <a:spLocks noGrp="1" noRot="1" noChangeAspect="1" noMove="1" noResize="1" noEditPoints="1" noAdjustHandles="1" noChangeArrowheads="1" noChangeShapeType="1" noTextEdit="1"/>
+          </p:cNvSpPr>
+          <p:nvPr>
+            <p:extLst>
+              <p:ext uri="{386F3935-93C4-4BCD-93E2-E3B085C9AB24}">
+                <p16:designElem xmlns:p16="http://schemas.microsoft.com/office/powerpoint/2015/main" val="1"/>
+              </p:ext>
+            </p:extLst>
+          </p:nvPr>
+        </p:nvSpPr>
+        <p:spPr>
+          <a:xfrm rot="5400000">
+            <a:off x="7950447" y="3392097"/>
+            <a:ext cx="1719072" cy="152382"/>
+          </a:xfrm>
+          <a:prstGeom prst="rect">
+            <a:avLst/>
+          </a:prstGeom>
+          <a:solidFill>
+            <a:schemeClr val="accent4"/>
+          </a:solidFill>
+          <a:ln>
+            <a:noFill/>
+          </a:ln>
+        </p:spPr>
+        <p:style>
+          <a:lnRef idx="2">
+            <a:schemeClr val="accent1">
+              <a:shade val="50000"/>
+            </a:schemeClr>
+          </a:lnRef>
+          <a:fillRef idx="1">
+            <a:schemeClr val="accent1"/>
+          </a:fillRef>
+          <a:effectRef idx="0">
+            <a:schemeClr val="accent1"/>
+          </a:effectRef>
+          <a:fontRef idx="minor">
+            <a:schemeClr val="lt1"/>
+          </a:fontRef>
+        </p:style>
+        <p:txBody>
+          <a:bodyPr rtlCol="0" anchor="ctr"/>
+          <a:lstStyle/>
+          <a:p>
+            <a:pPr algn="ctr"/>
+            <a:endParaRPr lang="en-US"/>
+          </a:p>
+        </p:txBody>
+      </p:sp>
+    </p:spTree>
+    <p:extLst>
+      <p:ext uri="{BB962C8B-B14F-4D97-AF65-F5344CB8AC3E}">
+        <p14:creationId xmlns:p14="http://schemas.microsoft.com/office/powerpoint/2010/main" val="924714743"/>
+      </p:ext>
+    </p:extLst>
+  </p:cSld>
+  <p:clrMapOvr>
+    <a:masterClrMapping/>
+  </p:clrMapOvr>
+</p:sld>
+</file>
+
+<file path=ppt/slides/slide6.xml><?xml version="1.0" encoding="utf-8"?>
 <p:sld xmlns:a="http://schemas.openxmlformats.org/drawingml/2006/main" xmlns:r="http://schemas.openxmlformats.org/officeDocument/2006/relationships" xmlns:p="http://schemas.openxmlformats.org/presentationml/2006/main">
   <p:cSld>
     <p:bg>
@@ -9125,191 +10303,7 @@
 </p:sld>
 </file>
 
-<file path=ppt/slides/slide5.xml><?xml version="1.0" encoding="utf-8"?>
-<p:sld xmlns:a="http://schemas.openxmlformats.org/drawingml/2006/main" xmlns:r="http://schemas.openxmlformats.org/officeDocument/2006/relationships" xmlns:p="http://schemas.openxmlformats.org/presentationml/2006/main">
-  <p:cSld>
-    <p:bg>
-      <p:bgPr>
-        <a:solidFill>
-          <a:schemeClr val="bg1"/>
-        </a:solidFill>
-        <a:effectLst/>
-      </p:bgPr>
-    </p:bg>
-    <p:spTree>
-      <p:nvGrpSpPr>
-        <p:cNvPr id="1" name=""/>
-        <p:cNvGrpSpPr/>
-        <p:nvPr/>
-      </p:nvGrpSpPr>
-      <p:grpSpPr>
-        <a:xfrm>
-          <a:off x="0" y="0"/>
-          <a:ext cx="0" cy="0"/>
-          <a:chOff x="0" y="0"/>
-          <a:chExt cx="0" cy="0"/>
-        </a:xfrm>
-      </p:grpSpPr>
-      <p:sp>
-        <p:nvSpPr>
-          <p:cNvPr id="25" name="Down Arrow 7">
-            <a:extLst>
-              <a:ext uri="{FF2B5EF4-FFF2-40B4-BE49-F238E27FC236}">
-                <a16:creationId xmlns:a16="http://schemas.microsoft.com/office/drawing/2014/main" id="{D4771268-CB57-404A-9271-370EB28F6090}"/>
-              </a:ext>
-              <a:ext uri="{C183D7F6-B498-43B3-948B-1728B52AA6E4}">
-                <adec:decorative xmlns:adec="http://schemas.microsoft.com/office/drawing/2017/decorative" val="1"/>
-              </a:ext>
-            </a:extLst>
-          </p:cNvPr>
-          <p:cNvSpPr>
-            <a:spLocks noGrp="1" noRot="1" noChangeAspect="1" noMove="1" noResize="1" noEditPoints="1" noAdjustHandles="1" noChangeArrowheads="1" noChangeShapeType="1" noTextEdit="1"/>
-          </p:cNvSpPr>
-          <p:nvPr>
-            <p:extLst>
-              <p:ext uri="{386F3935-93C4-4BCD-93E2-E3B085C9AB24}">
-                <p16:designElem xmlns:p16="http://schemas.microsoft.com/office/powerpoint/2015/main" val="1"/>
-              </p:ext>
-            </p:extLst>
-          </p:nvPr>
-        </p:nvSpPr>
-        <p:spPr>
-          <a:xfrm rot="16200000">
-            <a:off x="800100" y="1491343"/>
-            <a:ext cx="3333749" cy="3499103"/>
-          </a:xfrm>
-          <a:prstGeom prst="downArrow">
-            <a:avLst>
-              <a:gd name="adj1" fmla="val 100000"/>
-              <a:gd name="adj2" fmla="val 15788"/>
-            </a:avLst>
-          </a:prstGeom>
-          <a:solidFill>
-            <a:srgbClr val="404040"/>
-          </a:solidFill>
-          <a:ln w="53975">
-            <a:noFill/>
-          </a:ln>
-        </p:spPr>
-        <p:style>
-          <a:lnRef idx="2">
-            <a:schemeClr val="accent1">
-              <a:shade val="50000"/>
-            </a:schemeClr>
-          </a:lnRef>
-          <a:fillRef idx="1">
-            <a:schemeClr val="accent1"/>
-          </a:fillRef>
-          <a:effectRef idx="0">
-            <a:schemeClr val="accent1"/>
-          </a:effectRef>
-          <a:fontRef idx="minor">
-            <a:schemeClr val="lt1"/>
-          </a:fontRef>
-        </p:style>
-        <p:txBody>
-          <a:bodyPr rtlCol="0" anchor="ctr"/>
-          <a:lstStyle/>
-          <a:p>
-            <a:pPr algn="ctr"/>
-            <a:endParaRPr lang="en-US"/>
-          </a:p>
-        </p:txBody>
-      </p:sp>
-      <p:sp>
-        <p:nvSpPr>
-          <p:cNvPr id="2" name="Title 1">
-            <a:extLst>
-              <a:ext uri="{FF2B5EF4-FFF2-40B4-BE49-F238E27FC236}">
-                <a16:creationId xmlns:a16="http://schemas.microsoft.com/office/drawing/2014/main" id="{18A13ECF-8C54-8F6B-C54C-3BCA237A5A68}"/>
-              </a:ext>
-            </a:extLst>
-          </p:cNvPr>
-          <p:cNvSpPr>
-            <a:spLocks noGrp="1"/>
-          </p:cNvSpPr>
-          <p:nvPr>
-            <p:ph type="title"/>
-          </p:nvPr>
-        </p:nvSpPr>
-        <p:spPr>
-          <a:xfrm>
-            <a:off x="1028700" y="1967266"/>
-            <a:ext cx="2628900" cy="2547257"/>
-          </a:xfrm>
-          <a:noFill/>
-        </p:spPr>
-        <p:txBody>
-          <a:bodyPr vert="horz" lIns="91440" tIns="45720" rIns="91440" bIns="45720" rtlCol="0" anchor="ctr">
-            <a:normAutofit/>
-          </a:bodyPr>
-          <a:lstStyle/>
-          <a:p>
-            <a:pPr algn="ctr"/>
-            <a:r>
-              <a:rPr lang="en-US" sz="3600" kern="1200" dirty="0">
-                <a:solidFill>
-                  <a:srgbClr val="FFFFFF"/>
-                </a:solidFill>
-                <a:latin typeface="+mj-lt"/>
-                <a:ea typeface="+mj-ea"/>
-                <a:cs typeface="+mj-cs"/>
-              </a:rPr>
-              <a:t>Data Flow Diagram</a:t>
-            </a:r>
-          </a:p>
-        </p:txBody>
-      </p:sp>
-      <p:pic>
-        <p:nvPicPr>
-          <p:cNvPr id="4" name="Picture 3" descr="A diagram of a diagram&#10;&#10;Description automatically generated">
-            <a:extLst>
-              <a:ext uri="{FF2B5EF4-FFF2-40B4-BE49-F238E27FC236}">
-                <a16:creationId xmlns:a16="http://schemas.microsoft.com/office/drawing/2014/main" id="{5F9AAC1F-4012-B677-0F9F-B6BF38C048D8}"/>
-              </a:ext>
-            </a:extLst>
-          </p:cNvPr>
-          <p:cNvPicPr>
-            <a:picLocks noChangeAspect="1"/>
-          </p:cNvPicPr>
-          <p:nvPr/>
-        </p:nvPicPr>
-        <p:blipFill>
-          <a:blip r:embed="rId2">
-            <a:extLst>
-              <a:ext uri="{28A0092B-C50C-407E-A947-70E740481C1C}">
-                <a14:useLocalDpi xmlns:a14="http://schemas.microsoft.com/office/drawing/2010/main" val="0"/>
-              </a:ext>
-            </a:extLst>
-          </a:blip>
-          <a:stretch>
-            <a:fillRect/>
-          </a:stretch>
-        </p:blipFill>
-        <p:spPr>
-          <a:xfrm>
-            <a:off x="4291032" y="1462983"/>
-            <a:ext cx="7906344" cy="3627177"/>
-          </a:xfrm>
-          <a:prstGeom prst="rect">
-            <a:avLst/>
-          </a:prstGeom>
-        </p:spPr>
-      </p:pic>
-    </p:spTree>
-    <p:extLst>
-      <p:ext uri="{BB962C8B-B14F-4D97-AF65-F5344CB8AC3E}">
-        <p14:creationId xmlns:p14="http://schemas.microsoft.com/office/powerpoint/2010/main" val="924714743"/>
-      </p:ext>
-    </p:extLst>
-  </p:cSld>
-  <p:clrMapOvr>
-    <a:masterClrMapping/>
-  </p:clrMapOvr>
-</p:sld>
-</file>
-
-<file path=ppt/slides/slide6.xml><?xml version="1.0" encoding="utf-8"?>
+<file path=ppt/slides/slide7.xml><?xml version="1.0" encoding="utf-8"?>
 <p:sld xmlns:a="http://schemas.openxmlformats.org/drawingml/2006/main" xmlns:r="http://schemas.openxmlformats.org/officeDocument/2006/relationships" xmlns:p="http://schemas.openxmlformats.org/presentationml/2006/main">
   <p:cSld>
     <p:bg>
@@ -9611,7 +10605,7 @@
 </p:sld>
 </file>
 
-<file path=ppt/slides/slide7.xml><?xml version="1.0" encoding="utf-8"?>
+<file path=ppt/slides/slide8.xml><?xml version="1.0" encoding="utf-8"?>
 <p:sld xmlns:a="http://schemas.openxmlformats.org/drawingml/2006/main" xmlns:r="http://schemas.openxmlformats.org/officeDocument/2006/relationships" xmlns:p="http://schemas.openxmlformats.org/presentationml/2006/main">
   <p:cSld>
     <p:bg>

</xml_diff>